<commit_message>
Malta Data Saturday 0006
</commit_message>
<xml_diff>
--- a/statistics-an-unreliable-friend/pinellas-sql-server-usergroup-20210420/Statistics-An-Unreliable-Friend-Transmokopter.pptx
+++ b/statistics-an-unreliable-friend/pinellas-sql-server-usergroup-20210420/Statistics-An-Unreliable-Friend-Transmokopter.pptx
@@ -1119,7 +1119,7 @@
           <a:p>
             <a:fld id="{896D3B2D-3924-0B48-B558-93C031AA9A06}" type="datetimeFigureOut">
               <a:rPr lang="en-US" smtClean="0"/>
-              <a:t>4/20/2021</a:t>
+              <a:t>4/24/2021</a:t>
             </a:fld>
             <a:endParaRPr lang="en-US"/>
           </a:p>
@@ -1579,7 +1579,7 @@
             <a:fld id="{B61BEF0D-F0BB-DE4B-95CE-6DB70DBA9567}" type="datetimeFigureOut">
               <a:rPr lang="en-US"/>
               <a:pPr/>
-              <a:t>4/20/2021</a:t>
+              <a:t>4/24/2021</a:t>
             </a:fld>
             <a:endParaRPr lang="en-US"/>
           </a:p>
@@ -1863,7 +1863,7 @@
             <a:fld id="{B61BEF0D-F0BB-DE4B-95CE-6DB70DBA9567}" type="datetimeFigureOut">
               <a:rPr lang="en-US"/>
               <a:pPr/>
-              <a:t>4/20/2021</a:t>
+              <a:t>4/24/2021</a:t>
             </a:fld>
             <a:endParaRPr lang="en-US"/>
           </a:p>
@@ -2174,7 +2174,7 @@
             <a:fld id="{B61BEF0D-F0BB-DE4B-95CE-6DB70DBA9567}" type="datetimeFigureOut">
               <a:rPr lang="en-US"/>
               <a:pPr/>
-              <a:t>4/20/2021</a:t>
+              <a:t>4/24/2021</a:t>
             </a:fld>
             <a:endParaRPr lang="en-US"/>
           </a:p>
@@ -2512,7 +2512,7 @@
             <a:fld id="{B61BEF0D-F0BB-DE4B-95CE-6DB70DBA9567}" type="datetimeFigureOut">
               <a:rPr lang="en-US"/>
               <a:pPr/>
-              <a:t>4/20/2021</a:t>
+              <a:t>4/24/2021</a:t>
             </a:fld>
             <a:endParaRPr lang="en-US"/>
           </a:p>
@@ -2823,7 +2823,7 @@
             <a:fld id="{B61BEF0D-F0BB-DE4B-95CE-6DB70DBA9567}" type="datetimeFigureOut">
               <a:rPr lang="en-US"/>
               <a:pPr/>
-              <a:t>4/20/2021</a:t>
+              <a:t>4/24/2021</a:t>
             </a:fld>
             <a:endParaRPr lang="en-US"/>
           </a:p>
@@ -3213,7 +3213,7 @@
             <a:fld id="{B61BEF0D-F0BB-DE4B-95CE-6DB70DBA9567}" type="datetimeFigureOut">
               <a:rPr lang="en-US"/>
               <a:pPr/>
-              <a:t>4/20/2021</a:t>
+              <a:t>4/24/2021</a:t>
             </a:fld>
             <a:endParaRPr lang="en-US"/>
           </a:p>
@@ -3379,7 +3379,7 @@
           <a:p>
             <a:fld id="{55C6B4A9-1611-4792-9094-5F34BCA07E0B}" type="datetimeFigureOut">
               <a:rPr lang="en-US"/>
-              <a:t>4/20/2021</a:t>
+              <a:t>4/24/2021</a:t>
             </a:fld>
             <a:endParaRPr lang="en-US"/>
           </a:p>
@@ -3555,7 +3555,7 @@
             <a:fld id="{B61BEF0D-F0BB-DE4B-95CE-6DB70DBA9567}" type="datetimeFigureOut">
               <a:rPr lang="en-US"/>
               <a:pPr/>
-              <a:t>4/20/2021</a:t>
+              <a:t>4/24/2021</a:t>
             </a:fld>
             <a:endParaRPr lang="en-US"/>
           </a:p>
@@ -3759,7 +3759,7 @@
           <a:p>
             <a:fld id="{C2231AF4-6FC1-4460-BBC9-D7CD0B6E11EF}" type="datetimeFigureOut">
               <a:rPr lang="sv-SE" smtClean="0"/>
-              <a:t>2021-04-20</a:t>
+              <a:t>2021-04-24</a:t>
             </a:fld>
             <a:endParaRPr lang="sv-SE"/>
           </a:p>
@@ -3957,7 +3957,7 @@
           <a:p>
             <a:fld id="{C2231AF4-6FC1-4460-BBC9-D7CD0B6E11EF}" type="datetimeFigureOut">
               <a:rPr lang="sv-SE" smtClean="0"/>
-              <a:t>2021-04-20</a:t>
+              <a:t>2021-04-24</a:t>
             </a:fld>
             <a:endParaRPr lang="sv-SE"/>
           </a:p>
@@ -4232,7 +4232,7 @@
           <a:p>
             <a:fld id="{C2231AF4-6FC1-4460-BBC9-D7CD0B6E11EF}" type="datetimeFigureOut">
               <a:rPr lang="sv-SE" smtClean="0"/>
-              <a:t>2021-04-20</a:t>
+              <a:t>2021-04-24</a:t>
             </a:fld>
             <a:endParaRPr lang="sv-SE"/>
           </a:p>
@@ -4421,7 +4421,7 @@
             <a:fld id="{B61BEF0D-F0BB-DE4B-95CE-6DB70DBA9567}" type="datetimeFigureOut">
               <a:rPr lang="en-US"/>
               <a:pPr/>
-              <a:t>4/20/2021</a:t>
+              <a:t>4/24/2021</a:t>
             </a:fld>
             <a:endParaRPr lang="en-US"/>
           </a:p>
@@ -4670,7 +4670,7 @@
           <a:p>
             <a:fld id="{C2231AF4-6FC1-4460-BBC9-D7CD0B6E11EF}" type="datetimeFigureOut">
               <a:rPr lang="sv-SE" smtClean="0"/>
-              <a:t>2021-04-20</a:t>
+              <a:t>2021-04-24</a:t>
             </a:fld>
             <a:endParaRPr lang="sv-SE"/>
           </a:p>
@@ -5082,7 +5082,7 @@
           <a:p>
             <a:fld id="{C2231AF4-6FC1-4460-BBC9-D7CD0B6E11EF}" type="datetimeFigureOut">
               <a:rPr lang="sv-SE" smtClean="0"/>
-              <a:t>2021-04-20</a:t>
+              <a:t>2021-04-24</a:t>
             </a:fld>
             <a:endParaRPr lang="sv-SE"/>
           </a:p>
@@ -5223,7 +5223,7 @@
           <a:p>
             <a:fld id="{C2231AF4-6FC1-4460-BBC9-D7CD0B6E11EF}" type="datetimeFigureOut">
               <a:rPr lang="sv-SE" smtClean="0"/>
-              <a:t>2021-04-20</a:t>
+              <a:t>2021-04-24</a:t>
             </a:fld>
             <a:endParaRPr lang="sv-SE"/>
           </a:p>
@@ -5336,7 +5336,7 @@
           <a:p>
             <a:fld id="{C2231AF4-6FC1-4460-BBC9-D7CD0B6E11EF}" type="datetimeFigureOut">
               <a:rPr lang="sv-SE" smtClean="0"/>
-              <a:t>2021-04-20</a:t>
+              <a:t>2021-04-24</a:t>
             </a:fld>
             <a:endParaRPr lang="sv-SE"/>
           </a:p>
@@ -5647,7 +5647,7 @@
           <a:p>
             <a:fld id="{C2231AF4-6FC1-4460-BBC9-D7CD0B6E11EF}" type="datetimeFigureOut">
               <a:rPr lang="sv-SE" smtClean="0"/>
-              <a:t>2021-04-20</a:t>
+              <a:t>2021-04-24</a:t>
             </a:fld>
             <a:endParaRPr lang="sv-SE"/>
           </a:p>
@@ -5935,7 +5935,7 @@
           <a:p>
             <a:fld id="{C2231AF4-6FC1-4460-BBC9-D7CD0B6E11EF}" type="datetimeFigureOut">
               <a:rPr lang="sv-SE" smtClean="0"/>
-              <a:t>2021-04-20</a:t>
+              <a:t>2021-04-24</a:t>
             </a:fld>
             <a:endParaRPr lang="sv-SE"/>
           </a:p>
@@ -6133,7 +6133,7 @@
           <a:p>
             <a:fld id="{C2231AF4-6FC1-4460-BBC9-D7CD0B6E11EF}" type="datetimeFigureOut">
               <a:rPr lang="sv-SE" smtClean="0"/>
-              <a:t>2021-04-20</a:t>
+              <a:t>2021-04-24</a:t>
             </a:fld>
             <a:endParaRPr lang="sv-SE"/>
           </a:p>
@@ -6341,7 +6341,7 @@
           <a:p>
             <a:fld id="{C2231AF4-6FC1-4460-BBC9-D7CD0B6E11EF}" type="datetimeFigureOut">
               <a:rPr lang="sv-SE" smtClean="0"/>
-              <a:t>2021-04-20</a:t>
+              <a:t>2021-04-24</a:t>
             </a:fld>
             <a:endParaRPr lang="sv-SE"/>
           </a:p>
@@ -6601,7 +6601,7 @@
             <a:fld id="{B61BEF0D-F0BB-DE4B-95CE-6DB70DBA9567}" type="datetimeFigureOut">
               <a:rPr lang="en-US"/>
               <a:pPr/>
-              <a:t>4/20/2021</a:t>
+              <a:t>4/24/2021</a:t>
             </a:fld>
             <a:endParaRPr lang="en-US"/>
           </a:p>
@@ -6829,7 +6829,7 @@
           <a:p>
             <a:fld id="{EB712588-04B1-427B-82EE-E8DB90309F08}" type="datetimeFigureOut">
               <a:rPr lang="en-US"/>
-              <a:t>4/20/2021</a:t>
+              <a:t>4/24/2021</a:t>
             </a:fld>
             <a:endParaRPr lang="en-US"/>
           </a:p>
@@ -7199,7 +7199,7 @@
             <a:fld id="{B61BEF0D-F0BB-DE4B-95CE-6DB70DBA9567}" type="datetimeFigureOut">
               <a:rPr lang="en-US"/>
               <a:pPr/>
-              <a:t>4/20/2021</a:t>
+              <a:t>4/24/2021</a:t>
             </a:fld>
             <a:endParaRPr lang="en-US"/>
           </a:p>
@@ -7319,7 +7319,7 @@
             <a:fld id="{B61BEF0D-F0BB-DE4B-95CE-6DB70DBA9567}" type="datetimeFigureOut">
               <a:rPr lang="en-US"/>
               <a:pPr/>
-              <a:t>4/20/2021</a:t>
+              <a:t>4/24/2021</a:t>
             </a:fld>
             <a:endParaRPr lang="en-US"/>
           </a:p>
@@ -7411,7 +7411,7 @@
             <a:fld id="{B61BEF0D-F0BB-DE4B-95CE-6DB70DBA9567}" type="datetimeFigureOut">
               <a:rPr lang="en-US"/>
               <a:pPr/>
-              <a:t>4/20/2021</a:t>
+              <a:t>4/24/2021</a:t>
             </a:fld>
             <a:endParaRPr lang="en-US"/>
           </a:p>
@@ -7662,7 +7662,7 @@
           <a:p>
             <a:fld id="{42A54C80-263E-416B-A8E0-580EDEADCBDC}" type="datetimeFigureOut">
               <a:rPr lang="en-US"/>
-              <a:t>4/20/2021</a:t>
+              <a:t>4/24/2021</a:t>
             </a:fld>
             <a:endParaRPr lang="en-US"/>
           </a:p>
@@ -7921,7 +7921,7 @@
             <a:fld id="{B61BEF0D-F0BB-DE4B-95CE-6DB70DBA9567}" type="datetimeFigureOut">
               <a:rPr lang="en-US"/>
               <a:pPr/>
-              <a:t>4/20/2021</a:t>
+              <a:t>4/24/2021</a:t>
             </a:fld>
             <a:endParaRPr lang="en-US"/>
           </a:p>
@@ -8146,7 +8146,7 @@
             <a:fld id="{B61BEF0D-F0BB-DE4B-95CE-6DB70DBA9567}" type="datetimeFigureOut">
               <a:rPr lang="en-US"/>
               <a:pPr/>
-              <a:t>4/20/2021</a:t>
+              <a:t>4/24/2021</a:t>
             </a:fld>
             <a:endParaRPr lang="en-US"/>
           </a:p>
@@ -8853,7 +8853,7 @@
           <a:p>
             <a:fld id="{C2231AF4-6FC1-4460-BBC9-D7CD0B6E11EF}" type="datetimeFigureOut">
               <a:rPr lang="sv-SE" smtClean="0"/>
-              <a:t>2021-04-20</a:t>
+              <a:t>2021-04-24</a:t>
             </a:fld>
             <a:endParaRPr lang="sv-SE"/>
           </a:p>
@@ -12698,8 +12698,45 @@
           <a:p>
             <a:r>
               <a:rPr lang="sv-SE" dirty="0"/>
-              <a:t>Abbreviations.</a:t>
-            </a:r>
+              <a:t>Data </a:t>
+            </a:r>
+            <a:r>
+              <a:rPr lang="sv-SE" dirty="0" err="1"/>
+              <a:t>Platform</a:t>
+            </a:r>
+            <a:r>
+              <a:rPr lang="sv-SE" dirty="0"/>
+              <a:t> MVP, Microsoft </a:t>
+            </a:r>
+            <a:r>
+              <a:rPr lang="sv-SE" dirty="0" err="1"/>
+              <a:t>Certified</a:t>
+            </a:r>
+            <a:r>
+              <a:rPr lang="sv-SE" dirty="0"/>
+              <a:t> </a:t>
+            </a:r>
+            <a:r>
+              <a:rPr lang="sv-SE" dirty="0" err="1"/>
+              <a:t>Trainer</a:t>
+            </a:r>
+            <a:r>
+              <a:rPr lang="sv-SE" dirty="0"/>
+              <a:t>, </a:t>
+            </a:r>
+            <a:r>
+              <a:rPr lang="sv-SE" dirty="0" err="1"/>
+              <a:t>some</a:t>
+            </a:r>
+            <a:r>
+              <a:rPr lang="sv-SE" dirty="0"/>
+              <a:t> Boy Scout </a:t>
+            </a:r>
+            <a:r>
+              <a:rPr lang="sv-SE" dirty="0" err="1"/>
+              <a:t>badges</a:t>
+            </a:r>
+            <a:endParaRPr lang="sv-SE" dirty="0"/>
           </a:p>
           <a:p>
             <a:r>
@@ -12711,6 +12748,152 @@
               <a:t>organiser</a:t>
             </a:r>
             <a:endParaRPr lang="sv-SE" dirty="0"/>
+          </a:p>
+          <a:p>
+            <a:pPr lvl="1"/>
+            <a:r>
+              <a:rPr lang="sv-SE" dirty="0" err="1"/>
+              <a:t>Sql</a:t>
+            </a:r>
+            <a:r>
+              <a:rPr lang="sv-SE" dirty="0"/>
+              <a:t> </a:t>
+            </a:r>
+            <a:r>
+              <a:rPr lang="sv-SE" dirty="0" err="1"/>
+              <a:t>Friday</a:t>
+            </a:r>
+            <a:r>
+              <a:rPr lang="sv-SE" dirty="0"/>
+              <a:t> – </a:t>
+            </a:r>
+            <a:r>
+              <a:rPr lang="sv-SE" dirty="0">
+                <a:hlinkClick r:id="rId2"/>
+              </a:rPr>
+              <a:t>https://sqlfriday.net</a:t>
+            </a:r>
+            <a:r>
+              <a:rPr lang="sv-SE" dirty="0"/>
+              <a:t> – Noon Central </a:t>
+            </a:r>
+            <a:r>
+              <a:rPr lang="sv-SE" dirty="0" err="1"/>
+              <a:t>European</a:t>
+            </a:r>
+            <a:r>
+              <a:rPr lang="sv-SE" dirty="0"/>
+              <a:t> </a:t>
+            </a:r>
+            <a:r>
+              <a:rPr lang="sv-SE" dirty="0" err="1"/>
+              <a:t>Time</a:t>
+            </a:r>
+            <a:r>
+              <a:rPr lang="sv-SE" dirty="0"/>
+              <a:t> (</a:t>
+            </a:r>
+            <a:r>
+              <a:rPr lang="sv-SE" dirty="0" err="1"/>
+              <a:t>currently</a:t>
+            </a:r>
+            <a:r>
+              <a:rPr lang="sv-SE" dirty="0"/>
+              <a:t> 10:00 UTC) </a:t>
+            </a:r>
+            <a:r>
+              <a:rPr lang="sv-SE" dirty="0" err="1"/>
+              <a:t>every</a:t>
+            </a:r>
+            <a:r>
+              <a:rPr lang="sv-SE" dirty="0"/>
+              <a:t> </a:t>
+            </a:r>
+            <a:r>
+              <a:rPr lang="sv-SE" dirty="0" err="1"/>
+              <a:t>Friday</a:t>
+            </a:r>
+            <a:r>
+              <a:rPr lang="sv-SE" dirty="0"/>
+              <a:t>.</a:t>
+            </a:r>
+          </a:p>
+          <a:p>
+            <a:pPr lvl="1"/>
+            <a:r>
+              <a:rPr lang="sv-SE" dirty="0"/>
+              <a:t>Data Weekender – </a:t>
+            </a:r>
+            <a:r>
+              <a:rPr lang="sv-SE" dirty="0">
+                <a:hlinkClick r:id="rId3"/>
+              </a:rPr>
+              <a:t>www.dataweekender.com</a:t>
+            </a:r>
+            <a:r>
+              <a:rPr lang="sv-SE" dirty="0"/>
+              <a:t> – </a:t>
+            </a:r>
+            <a:r>
+              <a:rPr lang="sv-SE" dirty="0" err="1"/>
+              <a:t>one</a:t>
+            </a:r>
+            <a:r>
+              <a:rPr lang="sv-SE" dirty="0"/>
+              <a:t> </a:t>
+            </a:r>
+            <a:r>
+              <a:rPr lang="sv-SE" dirty="0" err="1"/>
+              <a:t>of</a:t>
+            </a:r>
+            <a:r>
+              <a:rPr lang="sv-SE" dirty="0"/>
+              <a:t> the </a:t>
+            </a:r>
+            <a:r>
+              <a:rPr lang="sv-SE" dirty="0" err="1"/>
+              <a:t>larger</a:t>
+            </a:r>
+            <a:r>
+              <a:rPr lang="sv-SE" dirty="0"/>
+              <a:t> </a:t>
+            </a:r>
+            <a:r>
+              <a:rPr lang="sv-SE" dirty="0" err="1"/>
+              <a:t>virtual</a:t>
+            </a:r>
+            <a:r>
+              <a:rPr lang="sv-SE" dirty="0"/>
+              <a:t> Data </a:t>
+            </a:r>
+            <a:r>
+              <a:rPr lang="sv-SE" dirty="0" err="1"/>
+              <a:t>Platform</a:t>
+            </a:r>
+            <a:r>
+              <a:rPr lang="sv-SE" dirty="0"/>
+              <a:t> </a:t>
+            </a:r>
+            <a:r>
+              <a:rPr lang="sv-SE" dirty="0" err="1"/>
+              <a:t>conferences</a:t>
+            </a:r>
+            <a:endParaRPr lang="sv-SE" dirty="0"/>
+          </a:p>
+          <a:p>
+            <a:pPr lvl="1"/>
+            <a:r>
+              <a:rPr lang="sv-SE" dirty="0"/>
+              <a:t>SQL Server </a:t>
+            </a:r>
+            <a:r>
+              <a:rPr lang="sv-SE" dirty="0" err="1"/>
+              <a:t>Usergroup</a:t>
+            </a:r>
+            <a:r>
+              <a:rPr lang="sv-SE" dirty="0"/>
+              <a:t> Sweden</a:t>
+            </a:r>
           </a:p>
           <a:p>
             <a:endParaRPr lang="sv-SE" dirty="0"/>

</xml_diff>